<commit_message>
se modificó la programacion y se incluyo la prueba de ingreso
</commit_message>
<xml_diff>
--- a/imagenes/Invtitation.pptx
+++ b/imagenes/Invtitation.pptx
@@ -255,7 +255,7 @@
           <a:p>
             <a:fld id="{662D30CF-6288-487A-96F5-CD6A5C538736}" type="datetimeFigureOut">
               <a:rPr lang="en-AU" smtClean="0"/>
-              <a:t>5/09/2019</a:t>
+              <a:t>12/09/2019</a:t>
             </a:fld>
             <a:endParaRPr lang="en-AU"/>
           </a:p>
@@ -425,7 +425,7 @@
           <a:p>
             <a:fld id="{662D30CF-6288-487A-96F5-CD6A5C538736}" type="datetimeFigureOut">
               <a:rPr lang="en-AU" smtClean="0"/>
-              <a:t>5/09/2019</a:t>
+              <a:t>12/09/2019</a:t>
             </a:fld>
             <a:endParaRPr lang="en-AU"/>
           </a:p>
@@ -605,7 +605,7 @@
           <a:p>
             <a:fld id="{662D30CF-6288-487A-96F5-CD6A5C538736}" type="datetimeFigureOut">
               <a:rPr lang="en-AU" smtClean="0"/>
-              <a:t>5/09/2019</a:t>
+              <a:t>12/09/2019</a:t>
             </a:fld>
             <a:endParaRPr lang="en-AU"/>
           </a:p>
@@ -775,7 +775,7 @@
           <a:p>
             <a:fld id="{662D30CF-6288-487A-96F5-CD6A5C538736}" type="datetimeFigureOut">
               <a:rPr lang="en-AU" smtClean="0"/>
-              <a:t>5/09/2019</a:t>
+              <a:t>12/09/2019</a:t>
             </a:fld>
             <a:endParaRPr lang="en-AU"/>
           </a:p>
@@ -1021,7 +1021,7 @@
           <a:p>
             <a:fld id="{662D30CF-6288-487A-96F5-CD6A5C538736}" type="datetimeFigureOut">
               <a:rPr lang="en-AU" smtClean="0"/>
-              <a:t>5/09/2019</a:t>
+              <a:t>12/09/2019</a:t>
             </a:fld>
             <a:endParaRPr lang="en-AU"/>
           </a:p>
@@ -1253,7 +1253,7 @@
           <a:p>
             <a:fld id="{662D30CF-6288-487A-96F5-CD6A5C538736}" type="datetimeFigureOut">
               <a:rPr lang="en-AU" smtClean="0"/>
-              <a:t>5/09/2019</a:t>
+              <a:t>12/09/2019</a:t>
             </a:fld>
             <a:endParaRPr lang="en-AU"/>
           </a:p>
@@ -1620,7 +1620,7 @@
           <a:p>
             <a:fld id="{662D30CF-6288-487A-96F5-CD6A5C538736}" type="datetimeFigureOut">
               <a:rPr lang="en-AU" smtClean="0"/>
-              <a:t>5/09/2019</a:t>
+              <a:t>12/09/2019</a:t>
             </a:fld>
             <a:endParaRPr lang="en-AU"/>
           </a:p>
@@ -1738,7 +1738,7 @@
           <a:p>
             <a:fld id="{662D30CF-6288-487A-96F5-CD6A5C538736}" type="datetimeFigureOut">
               <a:rPr lang="en-AU" smtClean="0"/>
-              <a:t>5/09/2019</a:t>
+              <a:t>12/09/2019</a:t>
             </a:fld>
             <a:endParaRPr lang="en-AU"/>
           </a:p>
@@ -1833,7 +1833,7 @@
           <a:p>
             <a:fld id="{662D30CF-6288-487A-96F5-CD6A5C538736}" type="datetimeFigureOut">
               <a:rPr lang="en-AU" smtClean="0"/>
-              <a:t>5/09/2019</a:t>
+              <a:t>12/09/2019</a:t>
             </a:fld>
             <a:endParaRPr lang="en-AU"/>
           </a:p>
@@ -2110,7 +2110,7 @@
           <a:p>
             <a:fld id="{662D30CF-6288-487A-96F5-CD6A5C538736}" type="datetimeFigureOut">
               <a:rPr lang="en-AU" smtClean="0"/>
-              <a:t>5/09/2019</a:t>
+              <a:t>12/09/2019</a:t>
             </a:fld>
             <a:endParaRPr lang="en-AU"/>
           </a:p>
@@ -2363,7 +2363,7 @@
           <a:p>
             <a:fld id="{662D30CF-6288-487A-96F5-CD6A5C538736}" type="datetimeFigureOut">
               <a:rPr lang="en-AU" smtClean="0"/>
-              <a:t>5/09/2019</a:t>
+              <a:t>12/09/2019</a:t>
             </a:fld>
             <a:endParaRPr lang="en-AU"/>
           </a:p>
@@ -2576,7 +2576,7 @@
           <a:p>
             <a:fld id="{662D30CF-6288-487A-96F5-CD6A5C538736}" type="datetimeFigureOut">
               <a:rPr lang="en-AU" smtClean="0"/>
-              <a:t>5/09/2019</a:t>
+              <a:t>12/09/2019</a:t>
             </a:fld>
             <a:endParaRPr lang="en-AU"/>
           </a:p>
@@ -3340,8 +3340,8 @@
         </p:nvSpPr>
         <p:spPr>
           <a:xfrm>
-            <a:off x="430927" y="177145"/>
-            <a:ext cx="5150065" cy="1737219"/>
+            <a:off x="430927" y="252250"/>
+            <a:ext cx="5150065" cy="1840792"/>
           </a:xfrm>
           <a:prstGeom prst="wedgeEllipseCallout">
             <a:avLst>
@@ -3383,13 +3383,34 @@
                   <a:schemeClr val="tx1"/>
                 </a:solidFill>
               </a:rPr>
-              <a:t>Este semestre vamos a explorar los avances de R presentados en </a:t>
-            </a:r>
+              <a:t>En este </a:t>
+            </a:r>
+            <a:r>
+              <a:rPr lang="es-CO" sz="2400" dirty="0" smtClean="0">
+                <a:solidFill>
+                  <a:schemeClr val="tx1"/>
+                </a:solidFill>
+              </a:rPr>
+              <a:t>semestre vamos a explorar los avances de R presentados </a:t>
+            </a:r>
+            <a:r>
+              <a:rPr lang="es-CO" sz="2400" dirty="0" smtClean="0">
+                <a:solidFill>
+                  <a:schemeClr val="tx1"/>
+                </a:solidFill>
+              </a:rPr>
+              <a:t>en el evento </a:t>
+            </a:r>
+            <a:endParaRPr lang="es-CO" sz="2400" dirty="0" smtClean="0">
+              <a:solidFill>
+                <a:schemeClr val="tx1"/>
+              </a:solidFill>
+            </a:endParaRPr>
           </a:p>
           <a:p>
             <a:pPr algn="ctr"/>
             <a:r>
-              <a:rPr lang="es-CO" sz="2400" dirty="0" err="1" smtClean="0">
+              <a:rPr lang="es-CO" sz="2800" dirty="0" err="1" smtClean="0">
                 <a:solidFill>
                   <a:schemeClr val="accent1">
                     <a:lumMod val="75000"/>
@@ -3399,26 +3420,16 @@
               <a:t>useR</a:t>
             </a:r>
             <a:r>
-              <a:rPr lang="es-CO" sz="2400" dirty="0" smtClean="0">
+              <a:rPr lang="es-CO" sz="2800" dirty="0" smtClean="0">
                 <a:solidFill>
                   <a:schemeClr val="accent1">
                     <a:lumMod val="75000"/>
                   </a:schemeClr>
                 </a:solidFill>
               </a:rPr>
-              <a:t>! </a:t>
-            </a:r>
-            <a:r>
-              <a:rPr lang="es-CO" sz="2400" dirty="0" smtClean="0">
-                <a:solidFill>
-                  <a:schemeClr val="accent1">
-                    <a:lumMod val="75000"/>
-                  </a:schemeClr>
-                </a:solidFill>
-              </a:rPr>
-              <a:t>2019</a:t>
-            </a:r>
-            <a:endParaRPr lang="en-AU" sz="2400" dirty="0">
+              <a:t>! 2019</a:t>
+            </a:r>
+            <a:endParaRPr lang="en-AU" sz="2800" dirty="0">
               <a:solidFill>
                 <a:schemeClr val="accent1">
                   <a:lumMod val="75000"/>

</xml_diff>

<commit_message>
se hicieron mejoras menores
</commit_message>
<xml_diff>
--- a/imagenes/Invtitation.pptx
+++ b/imagenes/Invtitation.pptx
@@ -8,6 +8,7 @@
     <p:sldId id="256" r:id="rId2"/>
     <p:sldId id="257" r:id="rId3"/>
     <p:sldId id="258" r:id="rId4"/>
+    <p:sldId id="259" r:id="rId5"/>
   </p:sldIdLst>
   <p:sldSz cx="12192000" cy="6858000"/>
   <p:notesSz cx="9144000" cy="6858000"/>
@@ -256,7 +257,7 @@
           <a:p>
             <a:fld id="{662D30CF-6288-487A-96F5-CD6A5C538736}" type="datetimeFigureOut">
               <a:rPr lang="en-AU" smtClean="0"/>
-              <a:t>4/03/2022</a:t>
+              <a:t>7/03/2022</a:t>
             </a:fld>
             <a:endParaRPr lang="en-AU"/>
           </a:p>
@@ -426,7 +427,7 @@
           <a:p>
             <a:fld id="{662D30CF-6288-487A-96F5-CD6A5C538736}" type="datetimeFigureOut">
               <a:rPr lang="en-AU" smtClean="0"/>
-              <a:t>4/03/2022</a:t>
+              <a:t>7/03/2022</a:t>
             </a:fld>
             <a:endParaRPr lang="en-AU"/>
           </a:p>
@@ -606,7 +607,7 @@
           <a:p>
             <a:fld id="{662D30CF-6288-487A-96F5-CD6A5C538736}" type="datetimeFigureOut">
               <a:rPr lang="en-AU" smtClean="0"/>
-              <a:t>4/03/2022</a:t>
+              <a:t>7/03/2022</a:t>
             </a:fld>
             <a:endParaRPr lang="en-AU"/>
           </a:p>
@@ -776,7 +777,7 @@
           <a:p>
             <a:fld id="{662D30CF-6288-487A-96F5-CD6A5C538736}" type="datetimeFigureOut">
               <a:rPr lang="en-AU" smtClean="0"/>
-              <a:t>4/03/2022</a:t>
+              <a:t>7/03/2022</a:t>
             </a:fld>
             <a:endParaRPr lang="en-AU"/>
           </a:p>
@@ -1022,7 +1023,7 @@
           <a:p>
             <a:fld id="{662D30CF-6288-487A-96F5-CD6A5C538736}" type="datetimeFigureOut">
               <a:rPr lang="en-AU" smtClean="0"/>
-              <a:t>4/03/2022</a:t>
+              <a:t>7/03/2022</a:t>
             </a:fld>
             <a:endParaRPr lang="en-AU"/>
           </a:p>
@@ -1254,7 +1255,7 @@
           <a:p>
             <a:fld id="{662D30CF-6288-487A-96F5-CD6A5C538736}" type="datetimeFigureOut">
               <a:rPr lang="en-AU" smtClean="0"/>
-              <a:t>4/03/2022</a:t>
+              <a:t>7/03/2022</a:t>
             </a:fld>
             <a:endParaRPr lang="en-AU"/>
           </a:p>
@@ -1621,7 +1622,7 @@
           <a:p>
             <a:fld id="{662D30CF-6288-487A-96F5-CD6A5C538736}" type="datetimeFigureOut">
               <a:rPr lang="en-AU" smtClean="0"/>
-              <a:t>4/03/2022</a:t>
+              <a:t>7/03/2022</a:t>
             </a:fld>
             <a:endParaRPr lang="en-AU"/>
           </a:p>
@@ -1739,7 +1740,7 @@
           <a:p>
             <a:fld id="{662D30CF-6288-487A-96F5-CD6A5C538736}" type="datetimeFigureOut">
               <a:rPr lang="en-AU" smtClean="0"/>
-              <a:t>4/03/2022</a:t>
+              <a:t>7/03/2022</a:t>
             </a:fld>
             <a:endParaRPr lang="en-AU"/>
           </a:p>
@@ -1834,7 +1835,7 @@
           <a:p>
             <a:fld id="{662D30CF-6288-487A-96F5-CD6A5C538736}" type="datetimeFigureOut">
               <a:rPr lang="en-AU" smtClean="0"/>
-              <a:t>4/03/2022</a:t>
+              <a:t>7/03/2022</a:t>
             </a:fld>
             <a:endParaRPr lang="en-AU"/>
           </a:p>
@@ -2111,7 +2112,7 @@
           <a:p>
             <a:fld id="{662D30CF-6288-487A-96F5-CD6A5C538736}" type="datetimeFigureOut">
               <a:rPr lang="en-AU" smtClean="0"/>
-              <a:t>4/03/2022</a:t>
+              <a:t>7/03/2022</a:t>
             </a:fld>
             <a:endParaRPr lang="en-AU"/>
           </a:p>
@@ -2364,7 +2365,7 @@
           <a:p>
             <a:fld id="{662D30CF-6288-487A-96F5-CD6A5C538736}" type="datetimeFigureOut">
               <a:rPr lang="en-AU" smtClean="0"/>
-              <a:t>4/03/2022</a:t>
+              <a:t>7/03/2022</a:t>
             </a:fld>
             <a:endParaRPr lang="en-AU"/>
           </a:p>
@@ -2577,7 +2578,7 @@
           <a:p>
             <a:fld id="{662D30CF-6288-487A-96F5-CD6A5C538736}" type="datetimeFigureOut">
               <a:rPr lang="en-AU" smtClean="0"/>
-              <a:t>4/03/2022</a:t>
+              <a:t>7/03/2022</a:t>
             </a:fld>
             <a:endParaRPr lang="en-AU"/>
           </a:p>
@@ -3587,6 +3588,245 @@
 </p:sld>
 </file>
 
+<file path=ppt/slides/slide4.xml><?xml version="1.0" encoding="utf-8"?>
+<p:sld xmlns:a="http://schemas.openxmlformats.org/drawingml/2006/main" xmlns:r="http://schemas.openxmlformats.org/officeDocument/2006/relationships" xmlns:p="http://schemas.openxmlformats.org/presentationml/2006/main">
+  <p:cSld>
+    <p:bg>
+      <p:bgPr>
+        <a:solidFill>
+          <a:srgbClr val="F1ECE3"/>
+        </a:solidFill>
+        <a:effectLst/>
+      </p:bgPr>
+    </p:bg>
+    <p:spTree>
+      <p:nvGrpSpPr>
+        <p:cNvPr id="1" name=""/>
+        <p:cNvGrpSpPr/>
+        <p:nvPr/>
+      </p:nvGrpSpPr>
+      <p:grpSpPr>
+        <a:xfrm>
+          <a:off x="0" y="0"/>
+          <a:ext cx="0" cy="0"/>
+          <a:chOff x="0" y="0"/>
+          <a:chExt cx="0" cy="0"/>
+        </a:xfrm>
+      </p:grpSpPr>
+      <p:pic>
+        <p:nvPicPr>
+          <p:cNvPr id="3" name="Picture 2" descr="A picture containing diagram&#10;&#10;Description automatically generated">
+            <a:extLst>
+              <a:ext uri="{FF2B5EF4-FFF2-40B4-BE49-F238E27FC236}">
+                <a16:creationId xmlns:a16="http://schemas.microsoft.com/office/drawing/2014/main" id="{7A9C9DEF-5F7B-4794-BD3D-98B3B6A76C82}"/>
+              </a:ext>
+            </a:extLst>
+          </p:cNvPr>
+          <p:cNvPicPr>
+            <a:picLocks noChangeAspect="1"/>
+          </p:cNvPicPr>
+          <p:nvPr/>
+        </p:nvPicPr>
+        <p:blipFill rotWithShape="1">
+          <a:blip r:embed="rId2" cstate="print">
+            <a:extLst>
+              <a:ext uri="{28A0092B-C50C-407E-A947-70E740481C1C}">
+                <a14:useLocalDpi xmlns:a14="http://schemas.microsoft.com/office/drawing/2010/main" val="0"/>
+              </a:ext>
+            </a:extLst>
+          </a:blip>
+          <a:srcRect b="7851"/>
+          <a:stretch/>
+        </p:blipFill>
+        <p:spPr>
+          <a:xfrm>
+            <a:off x="0" y="0"/>
+            <a:ext cx="5429820" cy="6319520"/>
+          </a:xfrm>
+          <a:prstGeom prst="rect">
+            <a:avLst/>
+          </a:prstGeom>
+        </p:spPr>
+      </p:pic>
+      <p:pic>
+        <p:nvPicPr>
+          <p:cNvPr id="5" name="Picture 4" descr="Icon&#10;&#10;Description automatically generated">
+            <a:extLst>
+              <a:ext uri="{FF2B5EF4-FFF2-40B4-BE49-F238E27FC236}">
+                <a16:creationId xmlns:a16="http://schemas.microsoft.com/office/drawing/2014/main" id="{3D4C2D08-BBC3-42DE-A107-DD6080B442A7}"/>
+              </a:ext>
+            </a:extLst>
+          </p:cNvPr>
+          <p:cNvPicPr>
+            <a:picLocks noChangeAspect="1"/>
+          </p:cNvPicPr>
+          <p:nvPr/>
+        </p:nvPicPr>
+        <p:blipFill>
+          <a:blip r:embed="rId3" cstate="print">
+            <a:extLst>
+              <a:ext uri="{28A0092B-C50C-407E-A947-70E740481C1C}">
+                <a14:useLocalDpi xmlns:a14="http://schemas.microsoft.com/office/drawing/2010/main" val="0"/>
+              </a:ext>
+            </a:extLst>
+          </a:blip>
+          <a:stretch>
+            <a:fillRect/>
+          </a:stretch>
+        </p:blipFill>
+        <p:spPr>
+          <a:xfrm>
+            <a:off x="3937000" y="4866640"/>
+            <a:ext cx="1341120" cy="1341120"/>
+          </a:xfrm>
+          <a:prstGeom prst="rect">
+            <a:avLst/>
+          </a:prstGeom>
+        </p:spPr>
+      </p:pic>
+      <p:pic>
+        <p:nvPicPr>
+          <p:cNvPr id="1026" name="Picture 2" descr="Welcome to Efficient R Programming">
+            <a:extLst>
+              <a:ext uri="{FF2B5EF4-FFF2-40B4-BE49-F238E27FC236}">
+                <a16:creationId xmlns:a16="http://schemas.microsoft.com/office/drawing/2014/main" id="{EB038ECF-5A5A-4680-BDC8-294A84F28E1C}"/>
+              </a:ext>
+            </a:extLst>
+          </p:cNvPr>
+          <p:cNvPicPr>
+            <a:picLocks noChangeAspect="1" noChangeArrowheads="1"/>
+          </p:cNvPicPr>
+          <p:nvPr/>
+        </p:nvPicPr>
+        <p:blipFill>
+          <a:blip r:embed="rId4" cstate="print">
+            <a:extLst>
+              <a:ext uri="{28A0092B-C50C-407E-A947-70E740481C1C}">
+                <a14:useLocalDpi xmlns:a14="http://schemas.microsoft.com/office/drawing/2010/main" val="0"/>
+              </a:ext>
+            </a:extLst>
+          </a:blip>
+          <a:srcRect/>
+          <a:stretch>
+            <a:fillRect/>
+          </a:stretch>
+        </p:blipFill>
+        <p:spPr bwMode="auto">
+          <a:xfrm>
+            <a:off x="1792774" y="2241345"/>
+            <a:ext cx="1882502" cy="2470355"/>
+          </a:xfrm>
+          <a:prstGeom prst="rect">
+            <a:avLst/>
+          </a:prstGeom>
+          <a:noFill/>
+          <a:extLst>
+            <a:ext uri="{909E8E84-426E-40DD-AFC4-6F175D3DCCD1}">
+              <a14:hiddenFill xmlns:a14="http://schemas.microsoft.com/office/drawing/2010/main">
+                <a:solidFill>
+                  <a:srgbClr val="FFFFFF"/>
+                </a:solidFill>
+              </a14:hiddenFill>
+            </a:ext>
+          </a:extLst>
+        </p:spPr>
+      </p:pic>
+      <p:sp>
+        <p:nvSpPr>
+          <p:cNvPr id="2" name="TextBox 1">
+            <a:extLst>
+              <a:ext uri="{FF2B5EF4-FFF2-40B4-BE49-F238E27FC236}">
+                <a16:creationId xmlns:a16="http://schemas.microsoft.com/office/drawing/2014/main" id="{4DE400AE-E2D7-4779-B399-B15CC92808F5}"/>
+              </a:ext>
+            </a:extLst>
+          </p:cNvPr>
+          <p:cNvSpPr txBox="1"/>
+          <p:nvPr/>
+        </p:nvSpPr>
+        <p:spPr>
+          <a:xfrm>
+            <a:off x="1309831" y="6339840"/>
+            <a:ext cx="2268698" cy="369332"/>
+          </a:xfrm>
+          <a:prstGeom prst="rect">
+            <a:avLst/>
+          </a:prstGeom>
+          <a:noFill/>
+        </p:spPr>
+        <p:txBody>
+          <a:bodyPr wrap="none" rtlCol="0">
+            <a:spAutoFit/>
+          </a:bodyPr>
+          <a:lstStyle/>
+          <a:p>
+            <a:r>
+              <a:rPr lang="es-419" dirty="0"/>
+              <a:t>Para más información </a:t>
+            </a:r>
+            <a:endParaRPr lang="es-ES" dirty="0"/>
+          </a:p>
+        </p:txBody>
+      </p:sp>
+      <p:pic>
+        <p:nvPicPr>
+          <p:cNvPr id="4" name="Picture 2" descr="Flecha Negra Clic PNG transparente - StickPNG">
+            <a:extLst>
+              <a:ext uri="{FF2B5EF4-FFF2-40B4-BE49-F238E27FC236}">
+                <a16:creationId xmlns:a16="http://schemas.microsoft.com/office/drawing/2014/main" id="{022D0BBC-EE3C-4B5D-B274-EB8C710850E3}"/>
+              </a:ext>
+            </a:extLst>
+          </p:cNvPr>
+          <p:cNvPicPr>
+            <a:picLocks noChangeAspect="1" noChangeArrowheads="1"/>
+          </p:cNvPicPr>
+          <p:nvPr/>
+        </p:nvPicPr>
+        <p:blipFill>
+          <a:blip r:embed="rId5" cstate="print">
+            <a:extLst>
+              <a:ext uri="{28A0092B-C50C-407E-A947-70E740481C1C}">
+                <a14:useLocalDpi xmlns:a14="http://schemas.microsoft.com/office/drawing/2010/main" val="0"/>
+              </a:ext>
+            </a:extLst>
+          </a:blip>
+          <a:srcRect/>
+          <a:stretch>
+            <a:fillRect/>
+          </a:stretch>
+        </p:blipFill>
+        <p:spPr bwMode="auto">
+          <a:xfrm>
+            <a:off x="3578529" y="6312932"/>
+            <a:ext cx="513080" cy="513080"/>
+          </a:xfrm>
+          <a:prstGeom prst="rect">
+            <a:avLst/>
+          </a:prstGeom>
+          <a:noFill/>
+          <a:extLst>
+            <a:ext uri="{909E8E84-426E-40DD-AFC4-6F175D3DCCD1}">
+              <a14:hiddenFill xmlns:a14="http://schemas.microsoft.com/office/drawing/2010/main">
+                <a:solidFill>
+                  <a:srgbClr val="FFFFFF"/>
+                </a:solidFill>
+              </a14:hiddenFill>
+            </a:ext>
+          </a:extLst>
+        </p:spPr>
+      </p:pic>
+    </p:spTree>
+    <p:extLst>
+      <p:ext uri="{BB962C8B-B14F-4D97-AF65-F5344CB8AC3E}">
+        <p14:creationId xmlns:p14="http://schemas.microsoft.com/office/powerpoint/2010/main" val="392882178"/>
+      </p:ext>
+    </p:extLst>
+  </p:cSld>
+  <p:clrMapOvr>
+    <a:masterClrMapping/>
+  </p:clrMapOvr>
+</p:sld>
+</file>
+
 <file path=ppt/theme/theme1.xml><?xml version="1.0" encoding="utf-8"?>
 <a:theme xmlns:a="http://schemas.openxmlformats.org/drawingml/2006/main" name="Tema de Office">
   <a:themeElements>

</xml_diff>

<commit_message>
se incluyo a rladies bquilla
</commit_message>
<xml_diff>
--- a/imagenes/Invtitation.pptx
+++ b/imagenes/Invtitation.pptx
@@ -9,6 +9,8 @@
     <p:sldId id="257" r:id="rId3"/>
     <p:sldId id="258" r:id="rId4"/>
     <p:sldId id="259" r:id="rId5"/>
+    <p:sldId id="260" r:id="rId6"/>
+    <p:sldId id="261" r:id="rId7"/>
   </p:sldIdLst>
   <p:sldSz cx="12192000" cy="6858000"/>
   <p:notesSz cx="9144000" cy="6858000"/>
@@ -257,7 +259,7 @@
           <a:p>
             <a:fld id="{662D30CF-6288-487A-96F5-CD6A5C538736}" type="datetimeFigureOut">
               <a:rPr lang="en-AU" smtClean="0"/>
-              <a:t>7/03/2022</a:t>
+              <a:t>9/03/2022</a:t>
             </a:fld>
             <a:endParaRPr lang="en-AU"/>
           </a:p>
@@ -427,7 +429,7 @@
           <a:p>
             <a:fld id="{662D30CF-6288-487A-96F5-CD6A5C538736}" type="datetimeFigureOut">
               <a:rPr lang="en-AU" smtClean="0"/>
-              <a:t>7/03/2022</a:t>
+              <a:t>9/03/2022</a:t>
             </a:fld>
             <a:endParaRPr lang="en-AU"/>
           </a:p>
@@ -607,7 +609,7 @@
           <a:p>
             <a:fld id="{662D30CF-6288-487A-96F5-CD6A5C538736}" type="datetimeFigureOut">
               <a:rPr lang="en-AU" smtClean="0"/>
-              <a:t>7/03/2022</a:t>
+              <a:t>9/03/2022</a:t>
             </a:fld>
             <a:endParaRPr lang="en-AU"/>
           </a:p>
@@ -777,7 +779,7 @@
           <a:p>
             <a:fld id="{662D30CF-6288-487A-96F5-CD6A5C538736}" type="datetimeFigureOut">
               <a:rPr lang="en-AU" smtClean="0"/>
-              <a:t>7/03/2022</a:t>
+              <a:t>9/03/2022</a:t>
             </a:fld>
             <a:endParaRPr lang="en-AU"/>
           </a:p>
@@ -1023,7 +1025,7 @@
           <a:p>
             <a:fld id="{662D30CF-6288-487A-96F5-CD6A5C538736}" type="datetimeFigureOut">
               <a:rPr lang="en-AU" smtClean="0"/>
-              <a:t>7/03/2022</a:t>
+              <a:t>9/03/2022</a:t>
             </a:fld>
             <a:endParaRPr lang="en-AU"/>
           </a:p>
@@ -1255,7 +1257,7 @@
           <a:p>
             <a:fld id="{662D30CF-6288-487A-96F5-CD6A5C538736}" type="datetimeFigureOut">
               <a:rPr lang="en-AU" smtClean="0"/>
-              <a:t>7/03/2022</a:t>
+              <a:t>9/03/2022</a:t>
             </a:fld>
             <a:endParaRPr lang="en-AU"/>
           </a:p>
@@ -1622,7 +1624,7 @@
           <a:p>
             <a:fld id="{662D30CF-6288-487A-96F5-CD6A5C538736}" type="datetimeFigureOut">
               <a:rPr lang="en-AU" smtClean="0"/>
-              <a:t>7/03/2022</a:t>
+              <a:t>9/03/2022</a:t>
             </a:fld>
             <a:endParaRPr lang="en-AU"/>
           </a:p>
@@ -1740,7 +1742,7 @@
           <a:p>
             <a:fld id="{662D30CF-6288-487A-96F5-CD6A5C538736}" type="datetimeFigureOut">
               <a:rPr lang="en-AU" smtClean="0"/>
-              <a:t>7/03/2022</a:t>
+              <a:t>9/03/2022</a:t>
             </a:fld>
             <a:endParaRPr lang="en-AU"/>
           </a:p>
@@ -1835,7 +1837,7 @@
           <a:p>
             <a:fld id="{662D30CF-6288-487A-96F5-CD6A5C538736}" type="datetimeFigureOut">
               <a:rPr lang="en-AU" smtClean="0"/>
-              <a:t>7/03/2022</a:t>
+              <a:t>9/03/2022</a:t>
             </a:fld>
             <a:endParaRPr lang="en-AU"/>
           </a:p>
@@ -2112,7 +2114,7 @@
           <a:p>
             <a:fld id="{662D30CF-6288-487A-96F5-CD6A5C538736}" type="datetimeFigureOut">
               <a:rPr lang="en-AU" smtClean="0"/>
-              <a:t>7/03/2022</a:t>
+              <a:t>9/03/2022</a:t>
             </a:fld>
             <a:endParaRPr lang="en-AU"/>
           </a:p>
@@ -2365,7 +2367,7 @@
           <a:p>
             <a:fld id="{662D30CF-6288-487A-96F5-CD6A5C538736}" type="datetimeFigureOut">
               <a:rPr lang="en-AU" smtClean="0"/>
-              <a:t>7/03/2022</a:t>
+              <a:t>9/03/2022</a:t>
             </a:fld>
             <a:endParaRPr lang="en-AU"/>
           </a:p>
@@ -2578,7 +2580,7 @@
           <a:p>
             <a:fld id="{662D30CF-6288-487A-96F5-CD6A5C538736}" type="datetimeFigureOut">
               <a:rPr lang="en-AU" smtClean="0"/>
-              <a:t>7/03/2022</a:t>
+              <a:t>9/03/2022</a:t>
             </a:fld>
             <a:endParaRPr lang="en-AU"/>
           </a:p>
@@ -3827,6 +3829,475 @@
 </p:sld>
 </file>
 
+<file path=ppt/slides/slide5.xml><?xml version="1.0" encoding="utf-8"?>
+<p:sld xmlns:a="http://schemas.openxmlformats.org/drawingml/2006/main" xmlns:r="http://schemas.openxmlformats.org/officeDocument/2006/relationships" xmlns:p="http://schemas.openxmlformats.org/presentationml/2006/main">
+  <p:cSld>
+    <p:bg>
+      <p:bgPr>
+        <a:solidFill>
+          <a:srgbClr val="F1ECE3"/>
+        </a:solidFill>
+        <a:effectLst/>
+      </p:bgPr>
+    </p:bg>
+    <p:spTree>
+      <p:nvGrpSpPr>
+        <p:cNvPr id="1" name=""/>
+        <p:cNvGrpSpPr/>
+        <p:nvPr/>
+      </p:nvGrpSpPr>
+      <p:grpSpPr>
+        <a:xfrm>
+          <a:off x="0" y="0"/>
+          <a:ext cx="0" cy="0"/>
+          <a:chOff x="0" y="0"/>
+          <a:chExt cx="0" cy="0"/>
+        </a:xfrm>
+      </p:grpSpPr>
+      <p:pic>
+        <p:nvPicPr>
+          <p:cNvPr id="9" name="Picture 8" descr="A picture containing logo&#10;&#10;Description automatically generated">
+            <a:extLst>
+              <a:ext uri="{FF2B5EF4-FFF2-40B4-BE49-F238E27FC236}">
+                <a16:creationId xmlns:a16="http://schemas.microsoft.com/office/drawing/2014/main" id="{6B8B7629-266D-4AD1-A3DD-53E79609AE36}"/>
+              </a:ext>
+            </a:extLst>
+          </p:cNvPr>
+          <p:cNvPicPr>
+            <a:picLocks noChangeAspect="1"/>
+          </p:cNvPicPr>
+          <p:nvPr/>
+        </p:nvPicPr>
+        <p:blipFill>
+          <a:blip r:embed="rId2" cstate="print">
+            <a:extLst>
+              <a:ext uri="{28A0092B-C50C-407E-A947-70E740481C1C}">
+                <a14:useLocalDpi xmlns:a14="http://schemas.microsoft.com/office/drawing/2010/main" val="0"/>
+              </a:ext>
+            </a:extLst>
+          </a:blip>
+          <a:stretch>
+            <a:fillRect/>
+          </a:stretch>
+        </p:blipFill>
+        <p:spPr>
+          <a:xfrm>
+            <a:off x="3810000" y="0"/>
+            <a:ext cx="4572000" cy="6858000"/>
+          </a:xfrm>
+          <a:prstGeom prst="rect">
+            <a:avLst/>
+          </a:prstGeom>
+        </p:spPr>
+      </p:pic>
+      <p:pic>
+        <p:nvPicPr>
+          <p:cNvPr id="5" name="Picture 4" descr="Icon&#10;&#10;Description automatically generated">
+            <a:extLst>
+              <a:ext uri="{FF2B5EF4-FFF2-40B4-BE49-F238E27FC236}">
+                <a16:creationId xmlns:a16="http://schemas.microsoft.com/office/drawing/2014/main" id="{3D4C2D08-BBC3-42DE-A107-DD6080B442A7}"/>
+              </a:ext>
+            </a:extLst>
+          </p:cNvPr>
+          <p:cNvPicPr>
+            <a:picLocks noChangeAspect="1"/>
+          </p:cNvPicPr>
+          <p:nvPr/>
+        </p:nvPicPr>
+        <p:blipFill>
+          <a:blip r:embed="rId3" cstate="print">
+            <a:extLst>
+              <a:ext uri="{28A0092B-C50C-407E-A947-70E740481C1C}">
+                <a14:useLocalDpi xmlns:a14="http://schemas.microsoft.com/office/drawing/2010/main" val="0"/>
+              </a:ext>
+            </a:extLst>
+          </a:blip>
+          <a:stretch>
+            <a:fillRect/>
+          </a:stretch>
+        </p:blipFill>
+        <p:spPr>
+          <a:xfrm>
+            <a:off x="8194367" y="3903079"/>
+            <a:ext cx="1341120" cy="1341120"/>
+          </a:xfrm>
+          <a:prstGeom prst="rect">
+            <a:avLst/>
+          </a:prstGeom>
+        </p:spPr>
+      </p:pic>
+      <p:pic>
+        <p:nvPicPr>
+          <p:cNvPr id="1026" name="Picture 2" descr="Welcome to Efficient R Programming">
+            <a:extLst>
+              <a:ext uri="{FF2B5EF4-FFF2-40B4-BE49-F238E27FC236}">
+                <a16:creationId xmlns:a16="http://schemas.microsoft.com/office/drawing/2014/main" id="{EB038ECF-5A5A-4680-BDC8-294A84F28E1C}"/>
+              </a:ext>
+            </a:extLst>
+          </p:cNvPr>
+          <p:cNvPicPr>
+            <a:picLocks noChangeAspect="1" noChangeArrowheads="1"/>
+          </p:cNvPicPr>
+          <p:nvPr/>
+        </p:nvPicPr>
+        <p:blipFill>
+          <a:blip r:embed="rId4" cstate="print">
+            <a:extLst>
+              <a:ext uri="{28A0092B-C50C-407E-A947-70E740481C1C}">
+                <a14:useLocalDpi xmlns:a14="http://schemas.microsoft.com/office/drawing/2010/main" val="0"/>
+              </a:ext>
+            </a:extLst>
+          </a:blip>
+          <a:srcRect/>
+          <a:stretch>
+            <a:fillRect/>
+          </a:stretch>
+        </p:blipFill>
+        <p:spPr bwMode="auto">
+          <a:xfrm>
+            <a:off x="5168655" y="1952914"/>
+            <a:ext cx="1638545" cy="2150217"/>
+          </a:xfrm>
+          <a:prstGeom prst="rect">
+            <a:avLst/>
+          </a:prstGeom>
+          <a:noFill/>
+          <a:extLst>
+            <a:ext uri="{909E8E84-426E-40DD-AFC4-6F175D3DCCD1}">
+              <a14:hiddenFill xmlns:a14="http://schemas.microsoft.com/office/drawing/2010/main">
+                <a:solidFill>
+                  <a:srgbClr val="FFFFFF"/>
+                </a:solidFill>
+              </a14:hiddenFill>
+            </a:ext>
+          </a:extLst>
+        </p:spPr>
+      </p:pic>
+      <p:sp>
+        <p:nvSpPr>
+          <p:cNvPr id="2" name="TextBox 1">
+            <a:extLst>
+              <a:ext uri="{FF2B5EF4-FFF2-40B4-BE49-F238E27FC236}">
+                <a16:creationId xmlns:a16="http://schemas.microsoft.com/office/drawing/2014/main" id="{4DE400AE-E2D7-4779-B399-B15CC92808F5}"/>
+              </a:ext>
+            </a:extLst>
+          </p:cNvPr>
+          <p:cNvSpPr txBox="1"/>
+          <p:nvPr/>
+        </p:nvSpPr>
+        <p:spPr>
+          <a:xfrm>
+            <a:off x="1309831" y="6339840"/>
+            <a:ext cx="2268698" cy="369332"/>
+          </a:xfrm>
+          <a:prstGeom prst="rect">
+            <a:avLst/>
+          </a:prstGeom>
+          <a:noFill/>
+        </p:spPr>
+        <p:txBody>
+          <a:bodyPr wrap="none" rtlCol="0">
+            <a:spAutoFit/>
+          </a:bodyPr>
+          <a:lstStyle/>
+          <a:p>
+            <a:r>
+              <a:rPr lang="es-419" dirty="0"/>
+              <a:t>Para más información </a:t>
+            </a:r>
+            <a:endParaRPr lang="es-ES" dirty="0"/>
+          </a:p>
+        </p:txBody>
+      </p:sp>
+      <p:pic>
+        <p:nvPicPr>
+          <p:cNvPr id="4" name="Picture 2" descr="Flecha Negra Clic PNG transparente - StickPNG">
+            <a:extLst>
+              <a:ext uri="{FF2B5EF4-FFF2-40B4-BE49-F238E27FC236}">
+                <a16:creationId xmlns:a16="http://schemas.microsoft.com/office/drawing/2014/main" id="{022D0BBC-EE3C-4B5D-B274-EB8C710850E3}"/>
+              </a:ext>
+            </a:extLst>
+          </p:cNvPr>
+          <p:cNvPicPr>
+            <a:picLocks noChangeAspect="1" noChangeArrowheads="1"/>
+          </p:cNvPicPr>
+          <p:nvPr/>
+        </p:nvPicPr>
+        <p:blipFill>
+          <a:blip r:embed="rId5" cstate="print">
+            <a:extLst>
+              <a:ext uri="{28A0092B-C50C-407E-A947-70E740481C1C}">
+                <a14:useLocalDpi xmlns:a14="http://schemas.microsoft.com/office/drawing/2010/main" val="0"/>
+              </a:ext>
+            </a:extLst>
+          </a:blip>
+          <a:srcRect/>
+          <a:stretch>
+            <a:fillRect/>
+          </a:stretch>
+        </p:blipFill>
+        <p:spPr bwMode="auto">
+          <a:xfrm>
+            <a:off x="3578529" y="6312932"/>
+            <a:ext cx="513080" cy="513080"/>
+          </a:xfrm>
+          <a:prstGeom prst="rect">
+            <a:avLst/>
+          </a:prstGeom>
+          <a:noFill/>
+          <a:extLst>
+            <a:ext uri="{909E8E84-426E-40DD-AFC4-6F175D3DCCD1}">
+              <a14:hiddenFill xmlns:a14="http://schemas.microsoft.com/office/drawing/2010/main">
+                <a:solidFill>
+                  <a:srgbClr val="FFFFFF"/>
+                </a:solidFill>
+              </a14:hiddenFill>
+            </a:ext>
+          </a:extLst>
+        </p:spPr>
+      </p:pic>
+    </p:spTree>
+    <p:extLst>
+      <p:ext uri="{BB962C8B-B14F-4D97-AF65-F5344CB8AC3E}">
+        <p14:creationId xmlns:p14="http://schemas.microsoft.com/office/powerpoint/2010/main" val="2043464750"/>
+      </p:ext>
+    </p:extLst>
+  </p:cSld>
+  <p:clrMapOvr>
+    <a:masterClrMapping/>
+  </p:clrMapOvr>
+</p:sld>
+</file>
+
+<file path=ppt/slides/slide6.xml><?xml version="1.0" encoding="utf-8"?>
+<p:sld xmlns:a="http://schemas.openxmlformats.org/drawingml/2006/main" xmlns:r="http://schemas.openxmlformats.org/officeDocument/2006/relationships" xmlns:p="http://schemas.openxmlformats.org/presentationml/2006/main">
+  <p:cSld>
+    <p:bg>
+      <p:bgPr>
+        <a:solidFill>
+          <a:srgbClr val="F1ECE3"/>
+        </a:solidFill>
+        <a:effectLst/>
+      </p:bgPr>
+    </p:bg>
+    <p:spTree>
+      <p:nvGrpSpPr>
+        <p:cNvPr id="1" name=""/>
+        <p:cNvGrpSpPr/>
+        <p:nvPr/>
+      </p:nvGrpSpPr>
+      <p:grpSpPr>
+        <a:xfrm>
+          <a:off x="0" y="0"/>
+          <a:ext cx="0" cy="0"/>
+          <a:chOff x="0" y="0"/>
+          <a:chExt cx="0" cy="0"/>
+        </a:xfrm>
+      </p:grpSpPr>
+      <p:pic>
+        <p:nvPicPr>
+          <p:cNvPr id="6" name="Picture 5" descr="A picture containing logo&#10;&#10;Description automatically generated">
+            <a:extLst>
+              <a:ext uri="{FF2B5EF4-FFF2-40B4-BE49-F238E27FC236}">
+                <a16:creationId xmlns:a16="http://schemas.microsoft.com/office/drawing/2014/main" id="{103EA298-FE11-414A-A23D-34ABB72EF169}"/>
+              </a:ext>
+            </a:extLst>
+          </p:cNvPr>
+          <p:cNvPicPr>
+            <a:picLocks noChangeAspect="1"/>
+          </p:cNvPicPr>
+          <p:nvPr/>
+        </p:nvPicPr>
+        <p:blipFill>
+          <a:blip r:embed="rId2" cstate="print">
+            <a:extLst>
+              <a:ext uri="{28A0092B-C50C-407E-A947-70E740481C1C}">
+                <a14:useLocalDpi xmlns:a14="http://schemas.microsoft.com/office/drawing/2010/main" val="0"/>
+              </a:ext>
+            </a:extLst>
+          </a:blip>
+          <a:stretch>
+            <a:fillRect/>
+          </a:stretch>
+        </p:blipFill>
+        <p:spPr>
+          <a:xfrm>
+            <a:off x="997970" y="0"/>
+            <a:ext cx="4572000" cy="6858000"/>
+          </a:xfrm>
+          <a:prstGeom prst="rect">
+            <a:avLst/>
+          </a:prstGeom>
+        </p:spPr>
+      </p:pic>
+      <p:pic>
+        <p:nvPicPr>
+          <p:cNvPr id="5" name="Picture 4" descr="Icon&#10;&#10;Description automatically generated">
+            <a:extLst>
+              <a:ext uri="{FF2B5EF4-FFF2-40B4-BE49-F238E27FC236}">
+                <a16:creationId xmlns:a16="http://schemas.microsoft.com/office/drawing/2014/main" id="{3D4C2D08-BBC3-42DE-A107-DD6080B442A7}"/>
+              </a:ext>
+            </a:extLst>
+          </p:cNvPr>
+          <p:cNvPicPr>
+            <a:picLocks noChangeAspect="1"/>
+          </p:cNvPicPr>
+          <p:nvPr/>
+        </p:nvPicPr>
+        <p:blipFill>
+          <a:blip r:embed="rId3" cstate="print">
+            <a:extLst>
+              <a:ext uri="{28A0092B-C50C-407E-A947-70E740481C1C}">
+                <a14:useLocalDpi xmlns:a14="http://schemas.microsoft.com/office/drawing/2010/main" val="0"/>
+              </a:ext>
+            </a:extLst>
+          </a:blip>
+          <a:stretch>
+            <a:fillRect/>
+          </a:stretch>
+        </p:blipFill>
+        <p:spPr>
+          <a:xfrm>
+            <a:off x="99137" y="4990199"/>
+            <a:ext cx="1341120" cy="1341120"/>
+          </a:xfrm>
+          <a:prstGeom prst="rect">
+            <a:avLst/>
+          </a:prstGeom>
+        </p:spPr>
+      </p:pic>
+      <p:pic>
+        <p:nvPicPr>
+          <p:cNvPr id="1026" name="Picture 2" descr="Welcome to Efficient R Programming">
+            <a:extLst>
+              <a:ext uri="{FF2B5EF4-FFF2-40B4-BE49-F238E27FC236}">
+                <a16:creationId xmlns:a16="http://schemas.microsoft.com/office/drawing/2014/main" id="{EB038ECF-5A5A-4680-BDC8-294A84F28E1C}"/>
+              </a:ext>
+            </a:extLst>
+          </p:cNvPr>
+          <p:cNvPicPr>
+            <a:picLocks noChangeAspect="1" noChangeArrowheads="1"/>
+          </p:cNvPicPr>
+          <p:nvPr/>
+        </p:nvPicPr>
+        <p:blipFill>
+          <a:blip r:embed="rId4" cstate="print">
+            <a:extLst>
+              <a:ext uri="{28A0092B-C50C-407E-A947-70E740481C1C}">
+                <a14:useLocalDpi xmlns:a14="http://schemas.microsoft.com/office/drawing/2010/main" val="0"/>
+              </a:ext>
+            </a:extLst>
+          </a:blip>
+          <a:srcRect/>
+          <a:stretch>
+            <a:fillRect/>
+          </a:stretch>
+        </p:blipFill>
+        <p:spPr bwMode="auto">
+          <a:xfrm>
+            <a:off x="2356625" y="1952914"/>
+            <a:ext cx="1638545" cy="2150217"/>
+          </a:xfrm>
+          <a:prstGeom prst="rect">
+            <a:avLst/>
+          </a:prstGeom>
+          <a:noFill/>
+          <a:extLst>
+            <a:ext uri="{909E8E84-426E-40DD-AFC4-6F175D3DCCD1}">
+              <a14:hiddenFill xmlns:a14="http://schemas.microsoft.com/office/drawing/2010/main">
+                <a:solidFill>
+                  <a:srgbClr val="FFFFFF"/>
+                </a:solidFill>
+              </a14:hiddenFill>
+            </a:ext>
+          </a:extLst>
+        </p:spPr>
+      </p:pic>
+      <p:pic>
+        <p:nvPicPr>
+          <p:cNvPr id="8" name="Picture 7" descr="Logo&#10;&#10;Description automatically generated">
+            <a:extLst>
+              <a:ext uri="{FF2B5EF4-FFF2-40B4-BE49-F238E27FC236}">
+                <a16:creationId xmlns:a16="http://schemas.microsoft.com/office/drawing/2014/main" id="{E8F536E3-053C-4DF0-9175-92381672A87E}"/>
+              </a:ext>
+            </a:extLst>
+          </p:cNvPr>
+          <p:cNvPicPr>
+            <a:picLocks noChangeAspect="1"/>
+          </p:cNvPicPr>
+          <p:nvPr/>
+        </p:nvPicPr>
+        <p:blipFill>
+          <a:blip r:embed="rId5" cstate="print">
+            <a:extLst>
+              <a:ext uri="{28A0092B-C50C-407E-A947-70E740481C1C}">
+                <a14:useLocalDpi xmlns:a14="http://schemas.microsoft.com/office/drawing/2010/main" val="0"/>
+              </a:ext>
+            </a:extLst>
+          </a:blip>
+          <a:stretch>
+            <a:fillRect/>
+          </a:stretch>
+        </p:blipFill>
+        <p:spPr>
+          <a:xfrm>
+            <a:off x="2609223" y="5660759"/>
+            <a:ext cx="1133348" cy="1168400"/>
+          </a:xfrm>
+          <a:prstGeom prst="rect">
+            <a:avLst/>
+          </a:prstGeom>
+        </p:spPr>
+      </p:pic>
+      <p:pic>
+        <p:nvPicPr>
+          <p:cNvPr id="13" name="Picture 12" descr="Logo&#10;&#10;Description automatically generated with medium confidence">
+            <a:extLst>
+              <a:ext uri="{FF2B5EF4-FFF2-40B4-BE49-F238E27FC236}">
+                <a16:creationId xmlns:a16="http://schemas.microsoft.com/office/drawing/2014/main" id="{1723B81E-00C6-4EF2-80D6-8E9A1034338C}"/>
+              </a:ext>
+            </a:extLst>
+          </p:cNvPr>
+          <p:cNvPicPr>
+            <a:picLocks noChangeAspect="1"/>
+          </p:cNvPicPr>
+          <p:nvPr/>
+        </p:nvPicPr>
+        <p:blipFill>
+          <a:blip r:embed="rId6">
+            <a:extLst>
+              <a:ext uri="{28A0092B-C50C-407E-A947-70E740481C1C}">
+                <a14:useLocalDpi xmlns:a14="http://schemas.microsoft.com/office/drawing/2010/main" val="0"/>
+              </a:ext>
+            </a:extLst>
+          </a:blip>
+          <a:stretch>
+            <a:fillRect/>
+          </a:stretch>
+        </p:blipFill>
+        <p:spPr>
+          <a:xfrm>
+            <a:off x="4494230" y="4817764"/>
+            <a:ext cx="2992882" cy="1685990"/>
+          </a:xfrm>
+          <a:prstGeom prst="rect">
+            <a:avLst/>
+          </a:prstGeom>
+        </p:spPr>
+      </p:pic>
+    </p:spTree>
+    <p:extLst>
+      <p:ext uri="{BB962C8B-B14F-4D97-AF65-F5344CB8AC3E}">
+        <p14:creationId xmlns:p14="http://schemas.microsoft.com/office/powerpoint/2010/main" val="1813960533"/>
+      </p:ext>
+    </p:extLst>
+  </p:cSld>
+  <p:clrMapOvr>
+    <a:masterClrMapping/>
+  </p:clrMapOvr>
+</p:sld>
+</file>
+
 <file path=ppt/theme/theme1.xml><?xml version="1.0" encoding="utf-8"?>
 <a:theme xmlns:a="http://schemas.openxmlformats.org/drawingml/2006/main" name="Tema de Office">
   <a:themeElements>

</xml_diff>

<commit_message>
Nuevo club de lectura
</commit_message>
<xml_diff>
--- a/imagenes/Invtitation.pptx
+++ b/imagenes/Invtitation.pptx
@@ -11,6 +11,7 @@
     <p:sldId id="259" r:id="rId5"/>
     <p:sldId id="260" r:id="rId6"/>
     <p:sldId id="261" r:id="rId7"/>
+    <p:sldId id="262" r:id="rId8"/>
   </p:sldIdLst>
   <p:sldSz cx="12192000" cy="6858000"/>
   <p:notesSz cx="9144000" cy="6858000"/>
@@ -259,7 +260,7 @@
           <a:p>
             <a:fld id="{662D30CF-6288-487A-96F5-CD6A5C538736}" type="datetimeFigureOut">
               <a:rPr lang="en-AU" smtClean="0"/>
-              <a:t>15/03/2022</a:t>
+              <a:t>21/04/2023</a:t>
             </a:fld>
             <a:endParaRPr lang="en-AU"/>
           </a:p>
@@ -429,7 +430,7 @@
           <a:p>
             <a:fld id="{662D30CF-6288-487A-96F5-CD6A5C538736}" type="datetimeFigureOut">
               <a:rPr lang="en-AU" smtClean="0"/>
-              <a:t>15/03/2022</a:t>
+              <a:t>21/04/2023</a:t>
             </a:fld>
             <a:endParaRPr lang="en-AU"/>
           </a:p>
@@ -609,7 +610,7 @@
           <a:p>
             <a:fld id="{662D30CF-6288-487A-96F5-CD6A5C538736}" type="datetimeFigureOut">
               <a:rPr lang="en-AU" smtClean="0"/>
-              <a:t>15/03/2022</a:t>
+              <a:t>21/04/2023</a:t>
             </a:fld>
             <a:endParaRPr lang="en-AU"/>
           </a:p>
@@ -779,7 +780,7 @@
           <a:p>
             <a:fld id="{662D30CF-6288-487A-96F5-CD6A5C538736}" type="datetimeFigureOut">
               <a:rPr lang="en-AU" smtClean="0"/>
-              <a:t>15/03/2022</a:t>
+              <a:t>21/04/2023</a:t>
             </a:fld>
             <a:endParaRPr lang="en-AU"/>
           </a:p>
@@ -1025,7 +1026,7 @@
           <a:p>
             <a:fld id="{662D30CF-6288-487A-96F5-CD6A5C538736}" type="datetimeFigureOut">
               <a:rPr lang="en-AU" smtClean="0"/>
-              <a:t>15/03/2022</a:t>
+              <a:t>21/04/2023</a:t>
             </a:fld>
             <a:endParaRPr lang="en-AU"/>
           </a:p>
@@ -1257,7 +1258,7 @@
           <a:p>
             <a:fld id="{662D30CF-6288-487A-96F5-CD6A5C538736}" type="datetimeFigureOut">
               <a:rPr lang="en-AU" smtClean="0"/>
-              <a:t>15/03/2022</a:t>
+              <a:t>21/04/2023</a:t>
             </a:fld>
             <a:endParaRPr lang="en-AU"/>
           </a:p>
@@ -1624,7 +1625,7 @@
           <a:p>
             <a:fld id="{662D30CF-6288-487A-96F5-CD6A5C538736}" type="datetimeFigureOut">
               <a:rPr lang="en-AU" smtClean="0"/>
-              <a:t>15/03/2022</a:t>
+              <a:t>21/04/2023</a:t>
             </a:fld>
             <a:endParaRPr lang="en-AU"/>
           </a:p>
@@ -1742,7 +1743,7 @@
           <a:p>
             <a:fld id="{662D30CF-6288-487A-96F5-CD6A5C538736}" type="datetimeFigureOut">
               <a:rPr lang="en-AU" smtClean="0"/>
-              <a:t>15/03/2022</a:t>
+              <a:t>21/04/2023</a:t>
             </a:fld>
             <a:endParaRPr lang="en-AU"/>
           </a:p>
@@ -1837,7 +1838,7 @@
           <a:p>
             <a:fld id="{662D30CF-6288-487A-96F5-CD6A5C538736}" type="datetimeFigureOut">
               <a:rPr lang="en-AU" smtClean="0"/>
-              <a:t>15/03/2022</a:t>
+              <a:t>21/04/2023</a:t>
             </a:fld>
             <a:endParaRPr lang="en-AU"/>
           </a:p>
@@ -2114,7 +2115,7 @@
           <a:p>
             <a:fld id="{662D30CF-6288-487A-96F5-CD6A5C538736}" type="datetimeFigureOut">
               <a:rPr lang="en-AU" smtClean="0"/>
-              <a:t>15/03/2022</a:t>
+              <a:t>21/04/2023</a:t>
             </a:fld>
             <a:endParaRPr lang="en-AU"/>
           </a:p>
@@ -2367,7 +2368,7 @@
           <a:p>
             <a:fld id="{662D30CF-6288-487A-96F5-CD6A5C538736}" type="datetimeFigureOut">
               <a:rPr lang="en-AU" smtClean="0"/>
-              <a:t>15/03/2022</a:t>
+              <a:t>21/04/2023</a:t>
             </a:fld>
             <a:endParaRPr lang="en-AU"/>
           </a:p>
@@ -2580,7 +2581,7 @@
           <a:p>
             <a:fld id="{662D30CF-6288-487A-96F5-CD6A5C538736}" type="datetimeFigureOut">
               <a:rPr lang="en-AU" smtClean="0"/>
-              <a:t>15/03/2022</a:t>
+              <a:t>21/04/2023</a:t>
             </a:fld>
             <a:endParaRPr lang="en-AU"/>
           </a:p>
@@ -4378,6 +4379,209 @@
 </p:sld>
 </file>
 
+<file path=ppt/slides/slide7.xml><?xml version="1.0" encoding="utf-8"?>
+<p:sld xmlns:a="http://schemas.openxmlformats.org/drawingml/2006/main" xmlns:r="http://schemas.openxmlformats.org/officeDocument/2006/relationships" xmlns:p="http://schemas.openxmlformats.org/presentationml/2006/main">
+  <p:cSld>
+    <p:bg>
+      <p:bgPr>
+        <a:solidFill>
+          <a:srgbClr val="F1ECE3"/>
+        </a:solidFill>
+        <a:effectLst/>
+      </p:bgPr>
+    </p:bg>
+    <p:spTree>
+      <p:nvGrpSpPr>
+        <p:cNvPr id="1" name=""/>
+        <p:cNvGrpSpPr/>
+        <p:nvPr/>
+      </p:nvGrpSpPr>
+      <p:grpSpPr>
+        <a:xfrm>
+          <a:off x="0" y="0"/>
+          <a:ext cx="0" cy="0"/>
+          <a:chOff x="0" y="0"/>
+          <a:chExt cx="0" cy="0"/>
+        </a:xfrm>
+      </p:grpSpPr>
+      <p:pic>
+        <p:nvPicPr>
+          <p:cNvPr id="3" name="Picture 2" descr="A picture containing diagram&#10;&#10;Description automatically generated">
+            <a:extLst>
+              <a:ext uri="{FF2B5EF4-FFF2-40B4-BE49-F238E27FC236}">
+                <a16:creationId xmlns:a16="http://schemas.microsoft.com/office/drawing/2014/main" id="{7A9C9DEF-5F7B-4794-BD3D-98B3B6A76C82}"/>
+              </a:ext>
+            </a:extLst>
+          </p:cNvPr>
+          <p:cNvPicPr>
+            <a:picLocks noChangeAspect="1"/>
+          </p:cNvPicPr>
+          <p:nvPr/>
+        </p:nvPicPr>
+        <p:blipFill rotWithShape="1">
+          <a:blip r:embed="rId2" cstate="print">
+            <a:extLst>
+              <a:ext uri="{28A0092B-C50C-407E-A947-70E740481C1C}">
+                <a14:useLocalDpi xmlns:a14="http://schemas.microsoft.com/office/drawing/2010/main" val="0"/>
+              </a:ext>
+            </a:extLst>
+          </a:blip>
+          <a:srcRect b="7851"/>
+          <a:stretch/>
+        </p:blipFill>
+        <p:spPr>
+          <a:xfrm>
+            <a:off x="0" y="0"/>
+            <a:ext cx="5429820" cy="6319520"/>
+          </a:xfrm>
+          <a:prstGeom prst="rect">
+            <a:avLst/>
+          </a:prstGeom>
+        </p:spPr>
+      </p:pic>
+      <p:sp>
+        <p:nvSpPr>
+          <p:cNvPr id="2" name="TextBox 1">
+            <a:extLst>
+              <a:ext uri="{FF2B5EF4-FFF2-40B4-BE49-F238E27FC236}">
+                <a16:creationId xmlns:a16="http://schemas.microsoft.com/office/drawing/2014/main" id="{4DE400AE-E2D7-4779-B399-B15CC92808F5}"/>
+              </a:ext>
+            </a:extLst>
+          </p:cNvPr>
+          <p:cNvSpPr txBox="1"/>
+          <p:nvPr/>
+        </p:nvSpPr>
+        <p:spPr>
+          <a:xfrm>
+            <a:off x="1309831" y="6339840"/>
+            <a:ext cx="2268698" cy="369332"/>
+          </a:xfrm>
+          <a:prstGeom prst="rect">
+            <a:avLst/>
+          </a:prstGeom>
+          <a:noFill/>
+        </p:spPr>
+        <p:txBody>
+          <a:bodyPr wrap="none" rtlCol="0">
+            <a:spAutoFit/>
+          </a:bodyPr>
+          <a:lstStyle/>
+          <a:p>
+            <a:r>
+              <a:rPr lang="es-419" dirty="0"/>
+              <a:t>Para más información </a:t>
+            </a:r>
+            <a:endParaRPr lang="es-ES" dirty="0"/>
+          </a:p>
+        </p:txBody>
+      </p:sp>
+      <p:pic>
+        <p:nvPicPr>
+          <p:cNvPr id="4" name="Picture 2" descr="Flecha Negra Clic PNG transparente - StickPNG">
+            <a:extLst>
+              <a:ext uri="{FF2B5EF4-FFF2-40B4-BE49-F238E27FC236}">
+                <a16:creationId xmlns:a16="http://schemas.microsoft.com/office/drawing/2014/main" id="{022D0BBC-EE3C-4B5D-B274-EB8C710850E3}"/>
+              </a:ext>
+            </a:extLst>
+          </p:cNvPr>
+          <p:cNvPicPr>
+            <a:picLocks noChangeAspect="1" noChangeArrowheads="1"/>
+          </p:cNvPicPr>
+          <p:nvPr/>
+        </p:nvPicPr>
+        <p:blipFill>
+          <a:blip r:embed="rId3" cstate="print">
+            <a:extLst>
+              <a:ext uri="{28A0092B-C50C-407E-A947-70E740481C1C}">
+                <a14:useLocalDpi xmlns:a14="http://schemas.microsoft.com/office/drawing/2010/main" val="0"/>
+              </a:ext>
+            </a:extLst>
+          </a:blip>
+          <a:srcRect/>
+          <a:stretch>
+            <a:fillRect/>
+          </a:stretch>
+        </p:blipFill>
+        <p:spPr bwMode="auto">
+          <a:xfrm>
+            <a:off x="3578529" y="6312932"/>
+            <a:ext cx="513080" cy="513080"/>
+          </a:xfrm>
+          <a:prstGeom prst="rect">
+            <a:avLst/>
+          </a:prstGeom>
+          <a:noFill/>
+          <a:extLst>
+            <a:ext uri="{909E8E84-426E-40DD-AFC4-6F175D3DCCD1}">
+              <a14:hiddenFill xmlns:a14="http://schemas.microsoft.com/office/drawing/2010/main">
+                <a:solidFill>
+                  <a:srgbClr val="FFFFFF"/>
+                </a:solidFill>
+              </a14:hiddenFill>
+            </a:ext>
+          </a:extLst>
+        </p:spPr>
+      </p:pic>
+      <p:pic>
+        <p:nvPicPr>
+          <p:cNvPr id="6" name="Picture 2" descr="Buy from Amazon">
+            <a:extLst>
+              <a:ext uri="{FF2B5EF4-FFF2-40B4-BE49-F238E27FC236}">
+                <a16:creationId xmlns:a16="http://schemas.microsoft.com/office/drawing/2014/main" id="{B55CE959-EFDC-DD82-87E4-0E9AA07725F0}"/>
+              </a:ext>
+            </a:extLst>
+          </p:cNvPr>
+          <p:cNvPicPr>
+            <a:picLocks noChangeAspect="1" noChangeArrowheads="1"/>
+          </p:cNvPicPr>
+          <p:nvPr/>
+        </p:nvPicPr>
+        <p:blipFill>
+          <a:blip r:embed="rId4" cstate="print">
+            <a:extLst>
+              <a:ext uri="{28A0092B-C50C-407E-A947-70E740481C1C}">
+                <a14:useLocalDpi xmlns:a14="http://schemas.microsoft.com/office/drawing/2010/main" val="0"/>
+              </a:ext>
+            </a:extLst>
+          </a:blip>
+          <a:srcRect/>
+          <a:stretch>
+            <a:fillRect/>
+          </a:stretch>
+        </p:blipFill>
+        <p:spPr bwMode="auto">
+          <a:xfrm>
+            <a:off x="1581294" y="2222017"/>
+            <a:ext cx="1914382" cy="2493895"/>
+          </a:xfrm>
+          <a:prstGeom prst="rect">
+            <a:avLst/>
+          </a:prstGeom>
+          <a:noFill/>
+          <a:extLst>
+            <a:ext uri="{909E8E84-426E-40DD-AFC4-6F175D3DCCD1}">
+              <a14:hiddenFill xmlns:a14="http://schemas.microsoft.com/office/drawing/2010/main">
+                <a:solidFill>
+                  <a:srgbClr val="FFFFFF"/>
+                </a:solidFill>
+              </a14:hiddenFill>
+            </a:ext>
+          </a:extLst>
+        </p:spPr>
+      </p:pic>
+    </p:spTree>
+    <p:extLst>
+      <p:ext uri="{BB962C8B-B14F-4D97-AF65-F5344CB8AC3E}">
+        <p14:creationId xmlns:p14="http://schemas.microsoft.com/office/powerpoint/2010/main" val="1832764893"/>
+      </p:ext>
+    </p:extLst>
+  </p:cSld>
+  <p:clrMapOvr>
+    <a:masterClrMapping/>
+  </p:clrMapOvr>
+</p:sld>
+</file>
+
 <file path=ppt/theme/theme1.xml><?xml version="1.0" encoding="utf-8"?>
 <a:theme xmlns:a="http://schemas.openxmlformats.org/drawingml/2006/main" name="Tema de Office">
   <a:themeElements>

</xml_diff>